<commit_message>
Image Album Presentation edit
Image Album Presentation edit
</commit_message>
<xml_diff>
--- a/ImageAlbum Presentation Final.pptx
+++ b/ImageAlbum Presentation Final.pptx
@@ -113,6 +113,22 @@
       </a:defRPr>
     </a:lvl9pPr>
   </p:defaultTextStyle>
+  <p:extLst>
+    <p:ext uri="{EFAFB233-063F-42B5-8137-9DF3F51BA10A}">
+      <p15:sldGuideLst xmlns:p15="http://schemas.microsoft.com/office/powerpoint/2012/main">
+        <p15:guide id="1" orient="horz" pos="2160">
+          <p15:clr>
+            <a:srgbClr val="A4A3A4"/>
+          </p15:clr>
+        </p15:guide>
+        <p15:guide id="2" pos="2880">
+          <p15:clr>
+            <a:srgbClr val="A4A3A4"/>
+          </p15:clr>
+        </p15:guide>
+      </p15:sldGuideLst>
+    </p:ext>
+  </p:extLst>
 </p:presentation>
 </file>
 
@@ -3833,7 +3849,9 @@
         </p:nvSpPr>
         <p:spPr/>
         <p:txBody>
-          <a:bodyPr/>
+          <a:bodyPr>
+            <a:normAutofit lnSpcReduction="10000"/>
+          </a:bodyPr>
           <a:lstStyle/>
           <a:p>
             <a:r>
@@ -3848,204 +3866,26 @@
           </a:p>
           <a:p>
             <a:r>
-              <a:rPr lang="hr-HR" dirty="0" err="1" smtClean="0"/>
-              <a:t>We</a:t>
-            </a:r>
-            <a:r>
               <a:rPr lang="hr-HR" dirty="0" smtClean="0"/>
-              <a:t> </a:t>
-            </a:r>
-            <a:r>
-              <a:rPr lang="hr-HR" dirty="0" err="1" smtClean="0"/>
-              <a:t>decided</a:t>
+              <a:t>We decided to refactor our Image Album Application in C# because C# offers better and more easier image processing abilities so we didn’t have to use any libraries like we had to use before in </a:t>
             </a:r>
             <a:r>
               <a:rPr lang="hr-HR" dirty="0" smtClean="0"/>
-              <a:t> to </a:t>
-            </a:r>
-            <a:r>
-              <a:rPr lang="hr-HR" dirty="0" err="1" smtClean="0"/>
-              <a:t>refactor</a:t>
-            </a:r>
+              <a:t>Java</a:t>
+            </a:r>
+            <a:r>
+              <a:rPr lang="en-US" dirty="0" smtClean="0"/>
+              <a:t>. Instead we used simple C# bitmap processing from the following project:</a:t>
+            </a:r>
+          </a:p>
+          <a:p>
             <a:r>
               <a:rPr lang="hr-HR" dirty="0" smtClean="0"/>
-              <a:t> </a:t>
-            </a:r>
-            <a:r>
-              <a:rPr lang="hr-HR" dirty="0" err="1" smtClean="0"/>
-              <a:t>our</a:t>
-            </a:r>
-            <a:r>
-              <a:rPr lang="hr-HR" dirty="0" smtClean="0"/>
-              <a:t> </a:t>
-            </a:r>
-            <a:r>
-              <a:rPr lang="hr-HR" dirty="0" err="1" smtClean="0"/>
-              <a:t>Image</a:t>
-            </a:r>
-            <a:r>
-              <a:rPr lang="hr-HR" dirty="0" smtClean="0"/>
-              <a:t> Album </a:t>
-            </a:r>
-            <a:r>
-              <a:rPr lang="hr-HR" dirty="0" err="1" smtClean="0"/>
-              <a:t>Application</a:t>
-            </a:r>
-            <a:r>
-              <a:rPr lang="hr-HR" dirty="0" smtClean="0"/>
-              <a:t> </a:t>
-            </a:r>
-            <a:r>
-              <a:rPr lang="hr-HR" dirty="0" err="1" smtClean="0"/>
-              <a:t>in</a:t>
-            </a:r>
-            <a:r>
-              <a:rPr lang="hr-HR" dirty="0" smtClean="0"/>
-              <a:t> C# </a:t>
-            </a:r>
-            <a:r>
-              <a:rPr lang="hr-HR" dirty="0" err="1" smtClean="0"/>
-              <a:t>because</a:t>
-            </a:r>
-            <a:r>
-              <a:rPr lang="hr-HR" dirty="0" smtClean="0"/>
-              <a:t> </a:t>
-            </a:r>
-            <a:r>
-              <a:rPr lang="hr-HR" dirty="0" err="1" smtClean="0"/>
-              <a:t>C</a:t>
-            </a:r>
-            <a:r>
-              <a:rPr lang="hr-HR" dirty="0" smtClean="0"/>
-              <a:t># </a:t>
-            </a:r>
-            <a:r>
-              <a:rPr lang="hr-HR" dirty="0" err="1" smtClean="0"/>
-              <a:t>offers</a:t>
-            </a:r>
-            <a:r>
-              <a:rPr lang="hr-HR" dirty="0" smtClean="0"/>
-              <a:t> </a:t>
-            </a:r>
-            <a:r>
-              <a:rPr lang="hr-HR" dirty="0" err="1" smtClean="0"/>
-              <a:t>better</a:t>
-            </a:r>
-            <a:r>
-              <a:rPr lang="hr-HR" dirty="0" smtClean="0"/>
-              <a:t> </a:t>
-            </a:r>
-            <a:r>
-              <a:rPr lang="hr-HR" dirty="0" err="1" smtClean="0"/>
-              <a:t>and</a:t>
-            </a:r>
-            <a:r>
-              <a:rPr lang="hr-HR" dirty="0" smtClean="0"/>
-              <a:t> more </a:t>
-            </a:r>
-            <a:r>
-              <a:rPr lang="hr-HR" dirty="0" err="1" smtClean="0"/>
-              <a:t>easier</a:t>
-            </a:r>
-            <a:r>
-              <a:rPr lang="hr-HR" dirty="0" smtClean="0"/>
-              <a:t> image </a:t>
-            </a:r>
-            <a:r>
-              <a:rPr lang="hr-HR" dirty="0" err="1" smtClean="0"/>
-              <a:t>processing</a:t>
-            </a:r>
-            <a:r>
-              <a:rPr lang="hr-HR" dirty="0" smtClean="0"/>
-              <a:t> </a:t>
-            </a:r>
-            <a:r>
-              <a:rPr lang="hr-HR" dirty="0" err="1" smtClean="0"/>
-              <a:t>abilities</a:t>
-            </a:r>
-            <a:r>
-              <a:rPr lang="hr-HR" dirty="0" smtClean="0"/>
-              <a:t> </a:t>
-            </a:r>
-            <a:r>
-              <a:rPr lang="hr-HR" dirty="0" err="1" smtClean="0"/>
-              <a:t>so</a:t>
-            </a:r>
-            <a:r>
-              <a:rPr lang="hr-HR" dirty="0" smtClean="0"/>
-              <a:t> </a:t>
-            </a:r>
-            <a:r>
-              <a:rPr lang="hr-HR" dirty="0" err="1" smtClean="0"/>
-              <a:t>we</a:t>
-            </a:r>
-            <a:r>
-              <a:rPr lang="hr-HR" dirty="0" smtClean="0"/>
-              <a:t> </a:t>
-            </a:r>
-            <a:r>
-              <a:rPr lang="hr-HR" dirty="0" err="1" smtClean="0"/>
-              <a:t>didn</a:t>
-            </a:r>
-            <a:r>
-              <a:rPr lang="hr-HR" dirty="0" smtClean="0"/>
-              <a:t>’t </a:t>
-            </a:r>
-            <a:r>
-              <a:rPr lang="hr-HR" dirty="0" err="1" smtClean="0"/>
-              <a:t>have</a:t>
-            </a:r>
-            <a:r>
-              <a:rPr lang="hr-HR" dirty="0" smtClean="0"/>
-              <a:t> to use </a:t>
-            </a:r>
-            <a:r>
-              <a:rPr lang="hr-HR" dirty="0" err="1" smtClean="0"/>
-              <a:t>any</a:t>
-            </a:r>
-            <a:r>
-              <a:rPr lang="hr-HR" dirty="0" smtClean="0"/>
-              <a:t> </a:t>
-            </a:r>
-            <a:r>
-              <a:rPr lang="hr-HR" dirty="0" err="1" smtClean="0"/>
-              <a:t>libraries</a:t>
-            </a:r>
-            <a:r>
-              <a:rPr lang="hr-HR" dirty="0" smtClean="0"/>
-              <a:t> </a:t>
-            </a:r>
-            <a:r>
-              <a:rPr lang="hr-HR" dirty="0" err="1" smtClean="0"/>
-              <a:t>like</a:t>
-            </a:r>
-            <a:r>
-              <a:rPr lang="hr-HR" dirty="0" smtClean="0"/>
-              <a:t> </a:t>
-            </a:r>
-            <a:r>
-              <a:rPr lang="hr-HR" dirty="0" err="1" smtClean="0"/>
-              <a:t>we</a:t>
-            </a:r>
-            <a:r>
-              <a:rPr lang="hr-HR" dirty="0" smtClean="0"/>
-              <a:t> had to use </a:t>
-            </a:r>
-            <a:r>
-              <a:rPr lang="hr-HR" dirty="0" err="1" smtClean="0"/>
-              <a:t>before</a:t>
-            </a:r>
-            <a:r>
-              <a:rPr lang="hr-HR" dirty="0" smtClean="0"/>
-              <a:t> </a:t>
-            </a:r>
-            <a:r>
-              <a:rPr lang="hr-HR" dirty="0" err="1" smtClean="0"/>
-              <a:t>in</a:t>
-            </a:r>
-            <a:r>
-              <a:rPr lang="hr-HR" dirty="0" smtClean="0"/>
-              <a:t> Java</a:t>
+              <a:t>http</a:t>
+            </a:r>
+            <a:r>
+              <a:rPr lang="hr-HR" dirty="0"/>
+              <a:t>://www.codeproject.com/Articles/33838/Image-Processing-using-C</a:t>
             </a:r>
             <a:endParaRPr lang="hr-HR" dirty="0"/>
           </a:p>
@@ -5166,13 +5006,15 @@
             </a:r>
             <a:r>
               <a:rPr lang="en-US" sz="2000" dirty="0"/>
-              <a:t> interface that requires</a:t>
-            </a:r>
-          </a:p>
-          <a:p>
+              <a:t> interface that </a:t>
+            </a:r>
+            <a:r>
+              <a:rPr lang="en-US" sz="2000" dirty="0" smtClean="0"/>
+              <a:t>requires the </a:t>
+            </a:r>
             <a:r>
               <a:rPr lang="en-US" sz="2000" dirty="0"/>
-              <a:t>the encode() method to be implemented. This method encodes data in a desired format. For example, </a:t>
+              <a:t>encode() method to be implemented. This method encodes data in a desired format. For example, </a:t>
             </a:r>
             <a:r>
               <a:rPr lang="en-US" sz="2000" dirty="0" err="1"/>
@@ -5212,78 +5054,17 @@
           </a:p>
           <a:p>
             <a:r>
-              <a:rPr lang="hr-HR" sz="2000" dirty="0" err="1" smtClean="0"/>
-              <a:t>In</a:t>
-            </a:r>
-            <a:r>
               <a:rPr lang="hr-HR" sz="2000" dirty="0" smtClean="0"/>
-              <a:t> </a:t>
-            </a:r>
-            <a:r>
-              <a:rPr lang="hr-HR" sz="2000" dirty="0" err="1" smtClean="0"/>
-              <a:t>our</a:t>
+              <a:t>In our case we implemented the JSON format for </a:t>
             </a:r>
             <a:r>
               <a:rPr lang="hr-HR" sz="2000" dirty="0" smtClean="0"/>
-              <a:t> </a:t>
-            </a:r>
-            <a:r>
-              <a:rPr lang="hr-HR" sz="2000" dirty="0" err="1" smtClean="0"/>
-              <a:t>case</a:t>
+              <a:t>storing </a:t>
             </a:r>
             <a:r>
               <a:rPr lang="hr-HR" sz="2000" dirty="0" smtClean="0"/>
-              <a:t> </a:t>
-            </a:r>
-            <a:r>
-              <a:rPr lang="hr-HR" sz="2000" dirty="0" err="1" smtClean="0"/>
-              <a:t>we</a:t>
-            </a:r>
-            <a:r>
-              <a:rPr lang="hr-HR" sz="2000" dirty="0" smtClean="0"/>
-              <a:t> </a:t>
-            </a:r>
-            <a:r>
-              <a:rPr lang="hr-HR" sz="2000" dirty="0" err="1" smtClean="0"/>
-              <a:t>implemented</a:t>
-            </a:r>
-            <a:r>
-              <a:rPr lang="hr-HR" sz="2000" dirty="0" smtClean="0"/>
-              <a:t> </a:t>
-            </a:r>
-            <a:r>
-              <a:rPr lang="hr-HR" sz="2000" dirty="0" err="1" smtClean="0"/>
-              <a:t>the</a:t>
-            </a:r>
-            <a:r>
-              <a:rPr lang="hr-HR" sz="2000" smtClean="0"/>
-              <a:t> JSON </a:t>
-            </a:r>
-            <a:r>
-              <a:rPr lang="hr-HR" sz="2000" dirty="0" smtClean="0"/>
-              <a:t>format for </a:t>
-            </a:r>
-            <a:r>
-              <a:rPr lang="hr-HR" sz="2000" dirty="0" err="1" smtClean="0"/>
-              <a:t>saving</a:t>
-            </a:r>
-            <a:r>
-              <a:rPr lang="hr-HR" sz="2000" dirty="0" smtClean="0"/>
-              <a:t> </a:t>
-            </a:r>
-            <a:r>
-              <a:rPr lang="hr-HR" sz="2000" dirty="0" err="1" smtClean="0"/>
-              <a:t>storing</a:t>
-            </a:r>
-            <a:r>
-              <a:rPr lang="hr-HR" sz="2000" dirty="0" smtClean="0"/>
-              <a:t> image </a:t>
-            </a:r>
-            <a:r>
-              <a:rPr lang="hr-HR" sz="2000" dirty="0" err="1" smtClean="0"/>
-              <a:t>data</a:t>
-            </a:r>
-            <a:endParaRPr lang="hr-HR" sz="2000" dirty="0" smtClean="0"/>
+              <a:t>image data</a:t>
+            </a:r>
           </a:p>
         </p:txBody>
       </p:sp>

</xml_diff>